<commit_message>
Update presentation to add slide about successes & challenges
</commit_message>
<xml_diff>
--- a/docs-planning/portfolio-preso-juliebro.pptx
+++ b/docs-planning/portfolio-preso-juliebro.pptx
@@ -5,16 +5,17 @@
     <p:sldMasterId id="2147483910" r:id="rId1"/>
   </p:sldMasterIdLst>
   <p:notesMasterIdLst>
-    <p:notesMasterId r:id="rId9"/>
+    <p:notesMasterId r:id="rId10"/>
   </p:notesMasterIdLst>
   <p:sldIdLst>
     <p:sldId id="262" r:id="rId2"/>
     <p:sldId id="260" r:id="rId3"/>
-    <p:sldId id="263" r:id="rId4"/>
-    <p:sldId id="270" r:id="rId5"/>
-    <p:sldId id="267" r:id="rId6"/>
-    <p:sldId id="271" r:id="rId7"/>
-    <p:sldId id="273" r:id="rId8"/>
+    <p:sldId id="267" r:id="rId4"/>
+    <p:sldId id="263" r:id="rId5"/>
+    <p:sldId id="270" r:id="rId6"/>
+    <p:sldId id="274" r:id="rId7"/>
+    <p:sldId id="271" r:id="rId8"/>
+    <p:sldId id="273" r:id="rId9"/>
   </p:sldIdLst>
   <p:sldSz cx="12192000" cy="6858000"/>
   <p:notesSz cx="6858000" cy="9144000"/>
@@ -113,6 +114,11 @@
       </a:defRPr>
     </a:lvl9pPr>
   </p:defaultTextStyle>
+  <p:extLst>
+    <p:ext uri="{EFAFB233-063F-42B5-8137-9DF3F51BA10A}">
+      <p15:sldGuideLst xmlns:p15="http://schemas.microsoft.com/office/powerpoint/2012/main"/>
+    </p:ext>
+  </p:extLst>
 </p:presentation>
 </file>
 
@@ -198,7 +204,7 @@
           <a:p>
             <a:fld id="{8E596131-B132-8047-BE93-0FA0E0C48636}" type="datetimeFigureOut">
               <a:rPr lang="en-US" smtClean="0"/>
-              <a:t>6/21/25</a:t>
+              <a:t>6/22/25</a:t>
             </a:fld>
             <a:endParaRPr lang="en-US"/>
           </a:p>
@@ -614,7 +620,7 @@
           <a:p>
             <a:fld id="{1470D93D-F960-4249-B710-63E692942261}" type="slidenum">
               <a:rPr lang="en-US" smtClean="0"/>
-              <a:t>5</a:t>
+              <a:t>3</a:t>
             </a:fld>
             <a:endParaRPr lang="en-US"/>
           </a:p>
@@ -634,6 +640,114 @@
 </file>
 
 <file path=ppt/notesSlides/notesSlide3.xml><?xml version="1.0" encoding="utf-8"?>
+<p:notes xmlns:a="http://schemas.openxmlformats.org/drawingml/2006/main" xmlns:r="http://schemas.openxmlformats.org/officeDocument/2006/relationships" xmlns:p="http://schemas.openxmlformats.org/presentationml/2006/main">
+  <p:cSld>
+    <p:spTree>
+      <p:nvGrpSpPr>
+        <p:cNvPr id="1" name="">
+          <a:extLst>
+            <a:ext uri="{FF2B5EF4-FFF2-40B4-BE49-F238E27FC236}">
+              <a16:creationId xmlns:a16="http://schemas.microsoft.com/office/drawing/2014/main" id="{E65ED9C4-2697-E0AD-5D80-FE24D0C25903}"/>
+            </a:ext>
+          </a:extLst>
+        </p:cNvPr>
+        <p:cNvGrpSpPr/>
+        <p:nvPr/>
+      </p:nvGrpSpPr>
+      <p:grpSpPr>
+        <a:xfrm>
+          <a:off x="0" y="0"/>
+          <a:ext cx="0" cy="0"/>
+          <a:chOff x="0" y="0"/>
+          <a:chExt cx="0" cy="0"/>
+        </a:xfrm>
+      </p:grpSpPr>
+      <p:sp>
+        <p:nvSpPr>
+          <p:cNvPr id="2" name="Slide Image Placeholder 1">
+            <a:extLst>
+              <a:ext uri="{FF2B5EF4-FFF2-40B4-BE49-F238E27FC236}">
+                <a16:creationId xmlns:a16="http://schemas.microsoft.com/office/drawing/2014/main" id="{D649A18C-D78C-3419-261F-1E8DBA29498C}"/>
+              </a:ext>
+            </a:extLst>
+          </p:cNvPr>
+          <p:cNvSpPr>
+            <a:spLocks noGrp="1" noRot="1" noChangeAspect="1"/>
+          </p:cNvSpPr>
+          <p:nvPr>
+            <p:ph type="sldImg"/>
+          </p:nvPr>
+        </p:nvSpPr>
+        <p:spPr/>
+      </p:sp>
+      <p:sp>
+        <p:nvSpPr>
+          <p:cNvPr id="3" name="Notes Placeholder 2">
+            <a:extLst>
+              <a:ext uri="{FF2B5EF4-FFF2-40B4-BE49-F238E27FC236}">
+                <a16:creationId xmlns:a16="http://schemas.microsoft.com/office/drawing/2014/main" id="{3252DA73-E287-8553-18D3-D8279E23DC4A}"/>
+              </a:ext>
+            </a:extLst>
+          </p:cNvPr>
+          <p:cNvSpPr>
+            <a:spLocks noGrp="1"/>
+          </p:cNvSpPr>
+          <p:nvPr>
+            <p:ph type="body" idx="1"/>
+          </p:nvPr>
+        </p:nvSpPr>
+        <p:spPr/>
+        <p:txBody>
+          <a:bodyPr/>
+          <a:lstStyle/>
+          <a:p>
+            <a:endParaRPr lang="en-US" dirty="0"/>
+          </a:p>
+        </p:txBody>
+      </p:sp>
+      <p:sp>
+        <p:nvSpPr>
+          <p:cNvPr id="4" name="Slide Number Placeholder 3">
+            <a:extLst>
+              <a:ext uri="{FF2B5EF4-FFF2-40B4-BE49-F238E27FC236}">
+                <a16:creationId xmlns:a16="http://schemas.microsoft.com/office/drawing/2014/main" id="{0AD46B99-075A-5BB6-DB11-5DBF13015682}"/>
+              </a:ext>
+            </a:extLst>
+          </p:cNvPr>
+          <p:cNvSpPr>
+            <a:spLocks noGrp="1"/>
+          </p:cNvSpPr>
+          <p:nvPr>
+            <p:ph type="sldNum" sz="quarter" idx="5"/>
+          </p:nvPr>
+        </p:nvSpPr>
+        <p:spPr/>
+        <p:txBody>
+          <a:bodyPr/>
+          <a:lstStyle/>
+          <a:p>
+            <a:fld id="{1470D93D-F960-4249-B710-63E692942261}" type="slidenum">
+              <a:rPr lang="en-US" smtClean="0"/>
+              <a:t>6</a:t>
+            </a:fld>
+            <a:endParaRPr lang="en-US"/>
+          </a:p>
+        </p:txBody>
+      </p:sp>
+    </p:spTree>
+    <p:extLst>
+      <p:ext uri="{BB962C8B-B14F-4D97-AF65-F5344CB8AC3E}">
+        <p14:creationId xmlns:p14="http://schemas.microsoft.com/office/powerpoint/2010/main" val="899481205"/>
+      </p:ext>
+    </p:extLst>
+  </p:cSld>
+  <p:clrMapOvr>
+    <a:masterClrMapping/>
+  </p:clrMapOvr>
+</p:notes>
+</file>
+
+<file path=ppt/notesSlides/notesSlide4.xml><?xml version="1.0" encoding="utf-8"?>
 <p:notes xmlns:a="http://schemas.openxmlformats.org/drawingml/2006/main" xmlns:r="http://schemas.openxmlformats.org/officeDocument/2006/relationships" xmlns:p="http://schemas.openxmlformats.org/presentationml/2006/main">
   <p:cSld>
     <p:spTree>
@@ -722,7 +836,7 @@
           <a:p>
             <a:fld id="{1470D93D-F960-4249-B710-63E692942261}" type="slidenum">
               <a:rPr lang="en-US" smtClean="0"/>
-              <a:t>6</a:t>
+              <a:t>7</a:t>
             </a:fld>
             <a:endParaRPr lang="en-US"/>
           </a:p>
@@ -741,7 +855,7 @@
 </p:notes>
 </file>
 
-<file path=ppt/notesSlides/notesSlide4.xml><?xml version="1.0" encoding="utf-8"?>
+<file path=ppt/notesSlides/notesSlide5.xml><?xml version="1.0" encoding="utf-8"?>
 <p:notes xmlns:a="http://schemas.openxmlformats.org/drawingml/2006/main" xmlns:r="http://schemas.openxmlformats.org/officeDocument/2006/relationships" xmlns:p="http://schemas.openxmlformats.org/presentationml/2006/main">
   <p:cSld>
     <p:spTree>
@@ -830,7 +944,7 @@
           <a:p>
             <a:fld id="{1470D93D-F960-4249-B710-63E692942261}" type="slidenum">
               <a:rPr lang="en-US" smtClean="0"/>
-              <a:t>7</a:t>
+              <a:t>8</a:t>
             </a:fld>
             <a:endParaRPr lang="en-US"/>
           </a:p>
@@ -996,7 +1110,7 @@
           <a:p>
             <a:fld id="{27C3EB79-4B76-6844-BA51-C941DF858173}" type="datetime1">
               <a:rPr lang="en-US" smtClean="0"/>
-              <a:t>6/21/25</a:t>
+              <a:t>6/22/25</a:t>
             </a:fld>
             <a:endParaRPr lang="en-US" dirty="0"/>
           </a:p>
@@ -1195,7 +1309,7 @@
           <a:p>
             <a:fld id="{D8CF9AE9-22FD-FA41-A1F2-29FF7FE4ECE1}" type="datetime1">
               <a:rPr lang="en-US" smtClean="0"/>
-              <a:t>6/21/25</a:t>
+              <a:t>6/22/25</a:t>
             </a:fld>
             <a:endParaRPr lang="en-US" dirty="0"/>
           </a:p>
@@ -1404,7 +1518,7 @@
           <a:p>
             <a:fld id="{B62D31F9-8748-0B4E-8097-214E6B372F6D}" type="datetime1">
               <a:rPr lang="en-US" smtClean="0"/>
-              <a:t>6/21/25</a:t>
+              <a:t>6/22/25</a:t>
             </a:fld>
             <a:endParaRPr lang="en-US" dirty="0"/>
           </a:p>
@@ -1603,7 +1717,7 @@
           <a:p>
             <a:fld id="{9308F748-AE99-6440-BF2C-6243626888D3}" type="datetime1">
               <a:rPr lang="en-US" smtClean="0"/>
-              <a:t>6/21/25</a:t>
+              <a:t>6/22/25</a:t>
             </a:fld>
             <a:endParaRPr lang="en-US" dirty="0"/>
           </a:p>
@@ -1892,7 +2006,7 @@
           <a:p>
             <a:fld id="{8AB47617-FBAD-474D-BF39-33A1F1369E33}" type="datetime1">
               <a:rPr lang="en-US" smtClean="0"/>
-              <a:t>6/21/25</a:t>
+              <a:t>6/22/25</a:t>
             </a:fld>
             <a:endParaRPr lang="en-US" dirty="0"/>
           </a:p>
@@ -2158,7 +2272,7 @@
           <a:p>
             <a:fld id="{82198CE9-3687-AB4A-96CA-57BC75D47EC9}" type="datetime1">
               <a:rPr lang="en-US" smtClean="0"/>
-              <a:t>6/21/25</a:t>
+              <a:t>6/22/25</a:t>
             </a:fld>
             <a:endParaRPr lang="en-US" dirty="0"/>
           </a:p>
@@ -2571,7 +2685,7 @@
           <a:p>
             <a:fld id="{8AD319E1-70A5-EF48-8CC6-0D87B7D0A99C}" type="datetime1">
               <a:rPr lang="en-US" smtClean="0"/>
-              <a:t>6/21/25</a:t>
+              <a:t>6/22/25</a:t>
             </a:fld>
             <a:endParaRPr lang="en-US" dirty="0"/>
           </a:p>
@@ -2713,7 +2827,7 @@
           <a:p>
             <a:fld id="{CD8A1FA1-36F6-DC43-A438-8CD942AE66CC}" type="datetime1">
               <a:rPr lang="en-US" smtClean="0"/>
-              <a:t>6/21/25</a:t>
+              <a:t>6/22/25</a:t>
             </a:fld>
             <a:endParaRPr lang="en-US" dirty="0"/>
           </a:p>
@@ -2827,7 +2941,7 @@
           <a:p>
             <a:fld id="{0DD14A32-CAC5-EC4C-ADCE-1255C5C2225B}" type="datetime1">
               <a:rPr lang="en-US" smtClean="0"/>
-              <a:t>6/21/25</a:t>
+              <a:t>6/22/25</a:t>
             </a:fld>
             <a:endParaRPr lang="en-US" dirty="0"/>
           </a:p>
@@ -3139,7 +3253,7 @@
           <a:p>
             <a:fld id="{CB19E2BC-E63B-AE4A-8E9D-5B23C036DAC8}" type="datetime1">
               <a:rPr lang="en-US" smtClean="0"/>
-              <a:t>6/21/25</a:t>
+              <a:t>6/22/25</a:t>
             </a:fld>
             <a:endParaRPr lang="en-US" dirty="0"/>
           </a:p>
@@ -3428,7 +3542,7 @@
           <a:p>
             <a:fld id="{FF1C9A8C-88A4-0346-839F-DCC1FDB013B8}" type="datetime1">
               <a:rPr lang="en-US" smtClean="0"/>
-              <a:t>6/21/25</a:t>
+              <a:t>6/22/25</a:t>
             </a:fld>
             <a:endParaRPr lang="en-US" dirty="0"/>
           </a:p>
@@ -3670,7 +3784,7 @@
           <a:p>
             <a:fld id="{9238015B-D3FF-6640-9627-2EC123340669}" type="datetime1">
               <a:rPr lang="en-US" smtClean="0"/>
-              <a:t>6/21/25</a:t>
+              <a:t>6/22/25</a:t>
             </a:fld>
             <a:endParaRPr lang="en-US" dirty="0"/>
           </a:p>
@@ -4420,7 +4534,7 @@
                   <a:spcPts val="600"/>
                 </a:spcAft>
               </a:pPr>
-              <a:t>6/21/25</a:t>
+              <a:t>6/22/25</a:t>
             </a:fld>
             <a:endParaRPr lang="en-US">
               <a:solidFill>
@@ -5110,7 +5224,7 @@
           <a:p>
             <a:fld id="{E64DCB27-C774-3B49-9C03-A6DFB6FCF569}" type="datetime1">
               <a:rPr lang="en-US" smtClean="0"/>
-              <a:t>6/21/25</a:t>
+              <a:t>6/22/25</a:t>
             </a:fld>
             <a:endParaRPr lang="en-US" dirty="0"/>
           </a:p>
@@ -5195,6 +5309,779 @@
 </file>
 
 <file path=ppt/slides/slide3.xml><?xml version="1.0" encoding="utf-8"?>
+<p:sld xmlns:a="http://schemas.openxmlformats.org/drawingml/2006/main" xmlns:r="http://schemas.openxmlformats.org/officeDocument/2006/relationships" xmlns:p="http://schemas.openxmlformats.org/presentationml/2006/main">
+  <p:cSld>
+    <p:bg>
+      <p:bgPr>
+        <a:solidFill>
+          <a:schemeClr val="bg1"/>
+        </a:solidFill>
+        <a:effectLst/>
+      </p:bgPr>
+    </p:bg>
+    <p:spTree>
+      <p:nvGrpSpPr>
+        <p:cNvPr id="1" name=""/>
+        <p:cNvGrpSpPr/>
+        <p:nvPr/>
+      </p:nvGrpSpPr>
+      <p:grpSpPr>
+        <a:xfrm>
+          <a:off x="0" y="0"/>
+          <a:ext cx="0" cy="0"/>
+          <a:chOff x="0" y="0"/>
+          <a:chExt cx="0" cy="0"/>
+        </a:xfrm>
+      </p:grpSpPr>
+      <p:sp useBgFill="1">
+        <p:nvSpPr>
+          <p:cNvPr id="11" name="Rectangle 10">
+            <a:extLst>
+              <a:ext uri="{FF2B5EF4-FFF2-40B4-BE49-F238E27FC236}">
+                <a16:creationId xmlns:a16="http://schemas.microsoft.com/office/drawing/2014/main" id="{DEE2AD96-B495-4E06-9291-B71706F728CB}"/>
+              </a:ext>
+              <a:ext uri="{C183D7F6-B498-43B3-948B-1728B52AA6E4}">
+                <adec:decorative xmlns:adec="http://schemas.microsoft.com/office/drawing/2017/decorative" val="1"/>
+              </a:ext>
+            </a:extLst>
+          </p:cNvPr>
+          <p:cNvSpPr>
+            <a:spLocks noGrp="1" noRot="1" noChangeAspect="1" noMove="1" noResize="1" noEditPoints="1" noAdjustHandles="1" noChangeArrowheads="1" noChangeShapeType="1" noTextEdit="1"/>
+          </p:cNvSpPr>
+          <p:nvPr>
+            <p:extLst>
+              <p:ext uri="{386F3935-93C4-4BCD-93E2-E3B085C9AB24}">
+                <p16:designElem xmlns:p16="http://schemas.microsoft.com/office/powerpoint/2015/main" val="1"/>
+              </p:ext>
+            </p:extLst>
+          </p:nvPr>
+        </p:nvSpPr>
+        <p:spPr>
+          <a:xfrm>
+            <a:off x="0" y="0"/>
+            <a:ext cx="12192000" cy="6858000"/>
+          </a:xfrm>
+          <a:prstGeom prst="rect">
+            <a:avLst/>
+          </a:prstGeom>
+          <a:ln w="12700" cap="flat" cmpd="sng" algn="ctr">
+            <a:noFill/>
+            <a:prstDash val="solid"/>
+            <a:miter lim="800000"/>
+          </a:ln>
+          <a:effectLst/>
+          <a:extLst>
+            <a:ext uri="{91240B29-F687-4F45-9708-019B960494DF}">
+              <a14:hiddenLine xmlns:a14="http://schemas.microsoft.com/office/drawing/2010/main" w="12700" cap="flat" cmpd="sng" algn="ctr">
+                <a:solidFill>
+                  <a:schemeClr val="accent1">
+                    <a:shade val="50000"/>
+                  </a:schemeClr>
+                </a:solidFill>
+                <a:prstDash val="solid"/>
+                <a:miter lim="800000"/>
+              </a14:hiddenLine>
+            </a:ext>
+          </a:extLst>
+        </p:spPr>
+        <p:style>
+          <a:lnRef idx="2">
+            <a:schemeClr val="accent1">
+              <a:shade val="50000"/>
+            </a:schemeClr>
+          </a:lnRef>
+          <a:fillRef idx="1">
+            <a:schemeClr val="accent1"/>
+          </a:fillRef>
+          <a:effectRef idx="0">
+            <a:schemeClr val="accent1"/>
+          </a:effectRef>
+          <a:fontRef idx="minor">
+            <a:schemeClr val="lt1"/>
+          </a:fontRef>
+        </p:style>
+        <p:txBody>
+          <a:bodyPr rtlCol="0" anchor="ctr"/>
+          <a:lstStyle/>
+          <a:p>
+            <a:pPr algn="ctr"/>
+            <a:endParaRPr lang="en-US"/>
+          </a:p>
+        </p:txBody>
+      </p:sp>
+      <p:sp>
+        <p:nvSpPr>
+          <p:cNvPr id="13" name="Rectangle 12">
+            <a:extLst>
+              <a:ext uri="{FF2B5EF4-FFF2-40B4-BE49-F238E27FC236}">
+                <a16:creationId xmlns:a16="http://schemas.microsoft.com/office/drawing/2014/main" id="{53CF6D67-C5A8-4ADD-9E8E-1E38CA1D3166}"/>
+              </a:ext>
+              <a:ext uri="{C183D7F6-B498-43B3-948B-1728B52AA6E4}">
+                <adec:decorative xmlns:adec="http://schemas.microsoft.com/office/drawing/2017/decorative" val="1"/>
+              </a:ext>
+            </a:extLst>
+          </p:cNvPr>
+          <p:cNvSpPr>
+            <a:spLocks noGrp="1" noRot="1" noChangeAspect="1" noMove="1" noResize="1" noEditPoints="1" noAdjustHandles="1" noChangeArrowheads="1" noChangeShapeType="1" noTextEdit="1"/>
+          </p:cNvSpPr>
+          <p:nvPr>
+            <p:extLst>
+              <p:ext uri="{386F3935-93C4-4BCD-93E2-E3B085C9AB24}">
+                <p16:designElem xmlns:p16="http://schemas.microsoft.com/office/powerpoint/2015/main" val="1"/>
+              </p:ext>
+            </p:extLst>
+          </p:nvPr>
+        </p:nvSpPr>
+        <p:spPr>
+          <a:xfrm rot="5400000" flipH="1">
+            <a:off x="-638515" y="639280"/>
+            <a:ext cx="6858000" cy="5579440"/>
+          </a:xfrm>
+          <a:prstGeom prst="rect">
+            <a:avLst/>
+          </a:prstGeom>
+          <a:gradFill>
+            <a:gsLst>
+              <a:gs pos="8000">
+                <a:srgbClr val="000000"/>
+              </a:gs>
+              <a:gs pos="100000">
+                <a:schemeClr val="accent1">
+                  <a:lumMod val="75000"/>
+                </a:schemeClr>
+              </a:gs>
+            </a:gsLst>
+            <a:lin ang="3000000" scaled="0"/>
+          </a:gradFill>
+          <a:ln>
+            <a:noFill/>
+          </a:ln>
+        </p:spPr>
+        <p:style>
+          <a:lnRef idx="2">
+            <a:schemeClr val="accent1">
+              <a:shade val="50000"/>
+            </a:schemeClr>
+          </a:lnRef>
+          <a:fillRef idx="1">
+            <a:schemeClr val="accent1"/>
+          </a:fillRef>
+          <a:effectRef idx="0">
+            <a:schemeClr val="accent1"/>
+          </a:effectRef>
+          <a:fontRef idx="minor">
+            <a:schemeClr val="lt1"/>
+          </a:fontRef>
+        </p:style>
+        <p:txBody>
+          <a:bodyPr rtlCol="0" anchor="ctr"/>
+          <a:lstStyle/>
+          <a:p>
+            <a:pPr algn="ctr"/>
+            <a:endParaRPr lang="en-US"/>
+          </a:p>
+        </p:txBody>
+      </p:sp>
+      <p:sp>
+        <p:nvSpPr>
+          <p:cNvPr id="15" name="Rectangle 14">
+            <a:extLst>
+              <a:ext uri="{FF2B5EF4-FFF2-40B4-BE49-F238E27FC236}">
+                <a16:creationId xmlns:a16="http://schemas.microsoft.com/office/drawing/2014/main" id="{86909FA0-B515-4681-B7A8-FA281D133B94}"/>
+              </a:ext>
+              <a:ext uri="{C183D7F6-B498-43B3-948B-1728B52AA6E4}">
+                <adec:decorative xmlns:adec="http://schemas.microsoft.com/office/drawing/2017/decorative" val="1"/>
+              </a:ext>
+            </a:extLst>
+          </p:cNvPr>
+          <p:cNvSpPr>
+            <a:spLocks noGrp="1" noRot="1" noChangeAspect="1" noMove="1" noResize="1" noEditPoints="1" noAdjustHandles="1" noChangeArrowheads="1" noChangeShapeType="1" noTextEdit="1"/>
+          </p:cNvSpPr>
+          <p:nvPr>
+            <p:extLst>
+              <p:ext uri="{386F3935-93C4-4BCD-93E2-E3B085C9AB24}">
+                <p16:designElem xmlns:p16="http://schemas.microsoft.com/office/powerpoint/2015/main" val="1"/>
+              </p:ext>
+            </p:extLst>
+          </p:nvPr>
+        </p:nvSpPr>
+        <p:spPr>
+          <a:xfrm rot="5400000" flipH="1">
+            <a:off x="-393206" y="395206"/>
+            <a:ext cx="6346209" cy="5576080"/>
+          </a:xfrm>
+          <a:prstGeom prst="rect">
+            <a:avLst/>
+          </a:prstGeom>
+          <a:gradFill>
+            <a:gsLst>
+              <a:gs pos="0">
+                <a:srgbClr val="000000">
+                  <a:alpha val="0"/>
+                </a:srgbClr>
+              </a:gs>
+              <a:gs pos="99000">
+                <a:schemeClr val="accent1">
+                  <a:alpha val="0"/>
+                </a:schemeClr>
+              </a:gs>
+            </a:gsLst>
+            <a:lin ang="1800000" scaled="0"/>
+          </a:gradFill>
+          <a:ln>
+            <a:noFill/>
+          </a:ln>
+        </p:spPr>
+        <p:style>
+          <a:lnRef idx="2">
+            <a:schemeClr val="accent1">
+              <a:shade val="50000"/>
+            </a:schemeClr>
+          </a:lnRef>
+          <a:fillRef idx="1">
+            <a:schemeClr val="accent1"/>
+          </a:fillRef>
+          <a:effectRef idx="0">
+            <a:schemeClr val="accent1"/>
+          </a:effectRef>
+          <a:fontRef idx="minor">
+            <a:schemeClr val="lt1"/>
+          </a:fontRef>
+        </p:style>
+        <p:txBody>
+          <a:bodyPr rtlCol="0" anchor="ctr"/>
+          <a:lstStyle/>
+          <a:p>
+            <a:pPr algn="ctr"/>
+            <a:endParaRPr lang="en-US"/>
+          </a:p>
+        </p:txBody>
+      </p:sp>
+      <p:sp>
+        <p:nvSpPr>
+          <p:cNvPr id="17" name="Rectangle 16">
+            <a:extLst>
+              <a:ext uri="{FF2B5EF4-FFF2-40B4-BE49-F238E27FC236}">
+                <a16:creationId xmlns:a16="http://schemas.microsoft.com/office/drawing/2014/main" id="{21C9FE86-FCC3-4A31-AA1C-C882262B7FE7}"/>
+              </a:ext>
+              <a:ext uri="{C183D7F6-B498-43B3-948B-1728B52AA6E4}">
+                <adec:decorative xmlns:adec="http://schemas.microsoft.com/office/drawing/2017/decorative" val="1"/>
+              </a:ext>
+            </a:extLst>
+          </p:cNvPr>
+          <p:cNvSpPr>
+            <a:spLocks noGrp="1" noRot="1" noChangeAspect="1" noMove="1" noResize="1" noEditPoints="1" noAdjustHandles="1" noChangeArrowheads="1" noChangeShapeType="1" noTextEdit="1"/>
+          </p:cNvSpPr>
+          <p:nvPr>
+            <p:extLst>
+              <p:ext uri="{386F3935-93C4-4BCD-93E2-E3B085C9AB24}">
+                <p16:designElem xmlns:p16="http://schemas.microsoft.com/office/powerpoint/2015/main" val="1"/>
+              </p:ext>
+            </p:extLst>
+          </p:nvPr>
+        </p:nvSpPr>
+        <p:spPr>
+          <a:xfrm rot="5400000" flipH="1">
+            <a:off x="1528907" y="2818967"/>
+            <a:ext cx="2501979" cy="5576080"/>
+          </a:xfrm>
+          <a:prstGeom prst="rect">
+            <a:avLst/>
+          </a:prstGeom>
+          <a:gradFill>
+            <a:gsLst>
+              <a:gs pos="2000">
+                <a:schemeClr val="accent1">
+                  <a:alpha val="29000"/>
+                </a:schemeClr>
+              </a:gs>
+              <a:gs pos="100000">
+                <a:srgbClr val="000000">
+                  <a:alpha val="30000"/>
+                </a:srgbClr>
+              </a:gs>
+            </a:gsLst>
+            <a:lin ang="7800000" scaled="0"/>
+          </a:gradFill>
+          <a:ln>
+            <a:noFill/>
+          </a:ln>
+        </p:spPr>
+        <p:style>
+          <a:lnRef idx="2">
+            <a:schemeClr val="accent1">
+              <a:shade val="50000"/>
+            </a:schemeClr>
+          </a:lnRef>
+          <a:fillRef idx="1">
+            <a:schemeClr val="accent1"/>
+          </a:fillRef>
+          <a:effectRef idx="0">
+            <a:schemeClr val="accent1"/>
+          </a:effectRef>
+          <a:fontRef idx="minor">
+            <a:schemeClr val="lt1"/>
+          </a:fontRef>
+        </p:style>
+        <p:txBody>
+          <a:bodyPr rtlCol="0" anchor="ctr"/>
+          <a:lstStyle/>
+          <a:p>
+            <a:pPr algn="ctr"/>
+            <a:endParaRPr lang="en-US" dirty="0"/>
+          </a:p>
+        </p:txBody>
+      </p:sp>
+      <p:sp>
+        <p:nvSpPr>
+          <p:cNvPr id="19" name="Rectangle 18">
+            <a:extLst>
+              <a:ext uri="{FF2B5EF4-FFF2-40B4-BE49-F238E27FC236}">
+                <a16:creationId xmlns:a16="http://schemas.microsoft.com/office/drawing/2014/main" id="{7D96243B-ECED-4B71-8E06-AE9A285EAD20}"/>
+              </a:ext>
+              <a:ext uri="{C183D7F6-B498-43B3-948B-1728B52AA6E4}">
+                <adec:decorative xmlns:adec="http://schemas.microsoft.com/office/drawing/2017/decorative" val="1"/>
+              </a:ext>
+            </a:extLst>
+          </p:cNvPr>
+          <p:cNvSpPr>
+            <a:spLocks noGrp="1" noRot="1" noChangeAspect="1" noMove="1" noResize="1" noEditPoints="1" noAdjustHandles="1" noChangeArrowheads="1" noChangeShapeType="1" noTextEdit="1"/>
+          </p:cNvSpPr>
+          <p:nvPr>
+            <p:extLst>
+              <p:ext uri="{386F3935-93C4-4BCD-93E2-E3B085C9AB24}">
+                <p16:designElem xmlns:p16="http://schemas.microsoft.com/office/powerpoint/2015/main" val="1"/>
+              </p:ext>
+            </p:extLst>
+          </p:nvPr>
+        </p:nvSpPr>
+        <p:spPr>
+          <a:xfrm rot="5400000" flipH="1">
+            <a:off x="-425002" y="852793"/>
+            <a:ext cx="6858001" cy="5152412"/>
+          </a:xfrm>
+          <a:prstGeom prst="rect">
+            <a:avLst/>
+          </a:prstGeom>
+          <a:gradFill>
+            <a:gsLst>
+              <a:gs pos="0">
+                <a:srgbClr val="000000">
+                  <a:alpha val="0"/>
+                </a:srgbClr>
+              </a:gs>
+              <a:gs pos="99000">
+                <a:schemeClr val="accent1">
+                  <a:alpha val="11000"/>
+                </a:schemeClr>
+              </a:gs>
+            </a:gsLst>
+            <a:lin ang="7800000" scaled="0"/>
+          </a:gradFill>
+          <a:ln>
+            <a:noFill/>
+          </a:ln>
+        </p:spPr>
+        <p:style>
+          <a:lnRef idx="2">
+            <a:schemeClr val="accent1">
+              <a:shade val="50000"/>
+            </a:schemeClr>
+          </a:lnRef>
+          <a:fillRef idx="1">
+            <a:schemeClr val="accent1"/>
+          </a:fillRef>
+          <a:effectRef idx="0">
+            <a:schemeClr val="accent1"/>
+          </a:effectRef>
+          <a:fontRef idx="minor">
+            <a:schemeClr val="lt1"/>
+          </a:fontRef>
+        </p:style>
+        <p:txBody>
+          <a:bodyPr rtlCol="0" anchor="ctr"/>
+          <a:lstStyle/>
+          <a:p>
+            <a:pPr algn="ctr"/>
+            <a:endParaRPr lang="en-US"/>
+          </a:p>
+        </p:txBody>
+      </p:sp>
+      <p:sp>
+        <p:nvSpPr>
+          <p:cNvPr id="21" name="Oval 20">
+            <a:extLst>
+              <a:ext uri="{FF2B5EF4-FFF2-40B4-BE49-F238E27FC236}">
+                <a16:creationId xmlns:a16="http://schemas.microsoft.com/office/drawing/2014/main" id="{A09989E4-EFDC-4A90-A633-E0525FB4139E}"/>
+              </a:ext>
+              <a:ext uri="{C183D7F6-B498-43B3-948B-1728B52AA6E4}">
+                <adec:decorative xmlns:adec="http://schemas.microsoft.com/office/drawing/2017/decorative" val="1"/>
+              </a:ext>
+            </a:extLst>
+          </p:cNvPr>
+          <p:cNvSpPr>
+            <a:spLocks noGrp="1" noRot="1" noChangeAspect="1" noMove="1" noResize="1" noEditPoints="1" noAdjustHandles="1" noChangeArrowheads="1" noChangeShapeType="1" noTextEdit="1"/>
+          </p:cNvSpPr>
+          <p:nvPr>
+            <p:extLst>
+              <p:ext uri="{386F3935-93C4-4BCD-93E2-E3B085C9AB24}">
+                <p16:designElem xmlns:p16="http://schemas.microsoft.com/office/powerpoint/2015/main" val="1"/>
+              </p:ext>
+            </p:extLst>
+          </p:nvPr>
+        </p:nvSpPr>
+        <p:spPr>
+          <a:xfrm rot="6097846">
+            <a:off x="818753" y="1128497"/>
+            <a:ext cx="4318303" cy="4318303"/>
+          </a:xfrm>
+          <a:prstGeom prst="ellipse">
+            <a:avLst/>
+          </a:prstGeom>
+          <a:gradFill>
+            <a:gsLst>
+              <a:gs pos="39000">
+                <a:schemeClr val="accent1">
+                  <a:alpha val="0"/>
+                </a:schemeClr>
+              </a:gs>
+              <a:gs pos="100000">
+                <a:schemeClr val="accent1">
+                  <a:lumMod val="60000"/>
+                  <a:lumOff val="40000"/>
+                  <a:alpha val="15000"/>
+                </a:schemeClr>
+              </a:gs>
+            </a:gsLst>
+            <a:lin ang="17400000" scaled="0"/>
+          </a:gradFill>
+          <a:ln>
+            <a:noFill/>
+          </a:ln>
+        </p:spPr>
+        <p:style>
+          <a:lnRef idx="2">
+            <a:schemeClr val="accent1">
+              <a:shade val="50000"/>
+            </a:schemeClr>
+          </a:lnRef>
+          <a:fillRef idx="1">
+            <a:schemeClr val="accent1"/>
+          </a:fillRef>
+          <a:effectRef idx="0">
+            <a:schemeClr val="accent1"/>
+          </a:effectRef>
+          <a:fontRef idx="minor">
+            <a:schemeClr val="lt1"/>
+          </a:fontRef>
+        </p:style>
+        <p:txBody>
+          <a:bodyPr rtlCol="0" anchor="ctr"/>
+          <a:lstStyle/>
+          <a:p>
+            <a:pPr algn="ctr"/>
+            <a:endParaRPr lang="en-US" dirty="0"/>
+          </a:p>
+        </p:txBody>
+      </p:sp>
+      <p:sp>
+        <p:nvSpPr>
+          <p:cNvPr id="2" name="Title 1">
+            <a:extLst>
+              <a:ext uri="{FF2B5EF4-FFF2-40B4-BE49-F238E27FC236}">
+                <a16:creationId xmlns:a16="http://schemas.microsoft.com/office/drawing/2014/main" id="{A89730DD-F570-1F2B-5EE4-5ECB8ED5CE59}"/>
+              </a:ext>
+            </a:extLst>
+          </p:cNvPr>
+          <p:cNvSpPr>
+            <a:spLocks noGrp="1"/>
+          </p:cNvSpPr>
+          <p:nvPr>
+            <p:ph type="title"/>
+          </p:nvPr>
+        </p:nvSpPr>
+        <p:spPr>
+          <a:xfrm>
+            <a:off x="826396" y="586855"/>
+            <a:ext cx="4230100" cy="3387497"/>
+          </a:xfrm>
+        </p:spPr>
+        <p:txBody>
+          <a:bodyPr anchor="b">
+            <a:normAutofit/>
+          </a:bodyPr>
+          <a:lstStyle/>
+          <a:p>
+            <a:pPr algn="r"/>
+            <a:r>
+              <a:rPr lang="en-US" sz="4000" dirty="0">
+                <a:solidFill>
+                  <a:srgbClr val="FFFFFF"/>
+                </a:solidFill>
+              </a:rPr>
+              <a:t>Key features</a:t>
+            </a:r>
+          </a:p>
+        </p:txBody>
+      </p:sp>
+      <p:sp>
+        <p:nvSpPr>
+          <p:cNvPr id="5" name="Footer Placeholder 4">
+            <a:extLst>
+              <a:ext uri="{FF2B5EF4-FFF2-40B4-BE49-F238E27FC236}">
+                <a16:creationId xmlns:a16="http://schemas.microsoft.com/office/drawing/2014/main" id="{F60C3EA6-DCFE-B2DE-F988-B414EFD57213}"/>
+              </a:ext>
+            </a:extLst>
+          </p:cNvPr>
+          <p:cNvSpPr>
+            <a:spLocks noGrp="1"/>
+          </p:cNvSpPr>
+          <p:nvPr>
+            <p:ph type="ftr" sz="quarter" idx="11"/>
+          </p:nvPr>
+        </p:nvSpPr>
+        <p:spPr>
+          <a:xfrm>
+            <a:off x="6900596" y="6455664"/>
+            <a:ext cx="4114800" cy="588051"/>
+          </a:xfrm>
+        </p:spPr>
+        <p:txBody>
+          <a:bodyPr>
+            <a:normAutofit/>
+          </a:bodyPr>
+          <a:lstStyle/>
+          <a:p>
+            <a:pPr>
+              <a:lnSpc>
+                <a:spcPct val="90000"/>
+              </a:lnSpc>
+              <a:spcAft>
+                <a:spcPts val="600"/>
+              </a:spcAft>
+            </a:pPr>
+            <a:r>
+              <a:rPr lang="en-US" sz="1100" dirty="0">
+                <a:solidFill>
+                  <a:schemeClr val="tx1">
+                    <a:lumMod val="50000"/>
+                    <a:lumOff val="50000"/>
+                  </a:schemeClr>
+                </a:solidFill>
+              </a:rPr>
+              <a:t>San Juan Islands Orca Sighting Service:  API doc presentation</a:t>
+            </a:r>
+          </a:p>
+          <a:p>
+            <a:pPr algn="l">
+              <a:lnSpc>
+                <a:spcPct val="90000"/>
+              </a:lnSpc>
+              <a:spcAft>
+                <a:spcPts val="600"/>
+              </a:spcAft>
+            </a:pPr>
+            <a:endParaRPr lang="en-US" sz="700" dirty="0">
+              <a:solidFill>
+                <a:schemeClr val="tx1">
+                  <a:lumMod val="50000"/>
+                  <a:lumOff val="50000"/>
+                </a:schemeClr>
+              </a:solidFill>
+            </a:endParaRPr>
+          </a:p>
+        </p:txBody>
+      </p:sp>
+      <p:sp>
+        <p:nvSpPr>
+          <p:cNvPr id="3" name="Content Placeholder 2">
+            <a:extLst>
+              <a:ext uri="{FF2B5EF4-FFF2-40B4-BE49-F238E27FC236}">
+                <a16:creationId xmlns:a16="http://schemas.microsoft.com/office/drawing/2014/main" id="{93B15F46-599B-7F27-B4A8-9FF6EDD3EB2C}"/>
+              </a:ext>
+            </a:extLst>
+          </p:cNvPr>
+          <p:cNvSpPr>
+            <a:spLocks noGrp="1"/>
+          </p:cNvSpPr>
+          <p:nvPr>
+            <p:ph idx="1"/>
+          </p:nvPr>
+        </p:nvSpPr>
+        <p:spPr>
+          <a:xfrm>
+            <a:off x="6503158" y="649480"/>
+            <a:ext cx="4862447" cy="5546047"/>
+          </a:xfrm>
+        </p:spPr>
+        <p:txBody>
+          <a:bodyPr anchor="ctr">
+            <a:normAutofit/>
+          </a:bodyPr>
+          <a:lstStyle/>
+          <a:p>
+            <a:r>
+              <a:rPr lang="en-US" sz="2400" dirty="0"/>
+              <a:t>Well-structured, searchable, and navigable documentation.</a:t>
+            </a:r>
+          </a:p>
+          <a:p>
+            <a:r>
+              <a:rPr lang="en-US" sz="2400" dirty="0"/>
+              <a:t>Clear and concise explanations.</a:t>
+            </a:r>
+          </a:p>
+          <a:p>
+            <a:r>
+              <a:rPr lang="en-US" sz="2400" dirty="0"/>
+              <a:t>Comprehensive API reference and helpful tutorials.</a:t>
+            </a:r>
+          </a:p>
+          <a:p>
+            <a:r>
+              <a:rPr lang="en-US" sz="2400" dirty="0"/>
+              <a:t>Focus on user experience and ease of adoption.</a:t>
+            </a:r>
+          </a:p>
+          <a:p>
+            <a:endParaRPr lang="en-US" sz="1700" dirty="0"/>
+          </a:p>
+        </p:txBody>
+      </p:sp>
+      <p:sp>
+        <p:nvSpPr>
+          <p:cNvPr id="4" name="Date Placeholder 3">
+            <a:extLst>
+              <a:ext uri="{FF2B5EF4-FFF2-40B4-BE49-F238E27FC236}">
+                <a16:creationId xmlns:a16="http://schemas.microsoft.com/office/drawing/2014/main" id="{617A8013-C101-BCE8-72C3-FD54061258D2}"/>
+              </a:ext>
+            </a:extLst>
+          </p:cNvPr>
+          <p:cNvSpPr>
+            <a:spLocks noGrp="1"/>
+          </p:cNvSpPr>
+          <p:nvPr>
+            <p:ph type="dt" sz="half" idx="10"/>
+          </p:nvPr>
+        </p:nvSpPr>
+        <p:spPr>
+          <a:xfrm>
+            <a:off x="8970264" y="6455664"/>
+            <a:ext cx="2743200" cy="365125"/>
+          </a:xfrm>
+        </p:spPr>
+        <p:txBody>
+          <a:bodyPr>
+            <a:normAutofit/>
+          </a:bodyPr>
+          <a:lstStyle/>
+          <a:p>
+            <a:pPr algn="r">
+              <a:spcAft>
+                <a:spcPts val="600"/>
+              </a:spcAft>
+            </a:pPr>
+            <a:fld id="{9308F748-AE99-6440-BF2C-6243626888D3}" type="datetime1">
+              <a:rPr lang="en-US" sz="1100">
+                <a:solidFill>
+                  <a:schemeClr val="tx1">
+                    <a:lumMod val="50000"/>
+                    <a:lumOff val="50000"/>
+                  </a:schemeClr>
+                </a:solidFill>
+              </a:rPr>
+              <a:pPr algn="r">
+                <a:spcAft>
+                  <a:spcPts val="600"/>
+                </a:spcAft>
+              </a:pPr>
+              <a:t>6/22/25</a:t>
+            </a:fld>
+            <a:endParaRPr lang="en-US" sz="1100" dirty="0">
+              <a:solidFill>
+                <a:schemeClr val="tx1">
+                  <a:lumMod val="50000"/>
+                  <a:lumOff val="50000"/>
+                </a:schemeClr>
+              </a:solidFill>
+            </a:endParaRPr>
+          </a:p>
+        </p:txBody>
+      </p:sp>
+      <p:sp>
+        <p:nvSpPr>
+          <p:cNvPr id="6" name="Slide Number Placeholder 5">
+            <a:extLst>
+              <a:ext uri="{FF2B5EF4-FFF2-40B4-BE49-F238E27FC236}">
+                <a16:creationId xmlns:a16="http://schemas.microsoft.com/office/drawing/2014/main" id="{595666C1-B530-DCB6-1CE9-A7BD001D66BF}"/>
+              </a:ext>
+            </a:extLst>
+          </p:cNvPr>
+          <p:cNvSpPr>
+            <a:spLocks noGrp="1"/>
+          </p:cNvSpPr>
+          <p:nvPr>
+            <p:ph type="sldNum" sz="quarter" idx="12"/>
+          </p:nvPr>
+        </p:nvSpPr>
+        <p:spPr>
+          <a:xfrm>
+            <a:off x="11704320" y="6455664"/>
+            <a:ext cx="448056" cy="365125"/>
+          </a:xfrm>
+        </p:spPr>
+        <p:txBody>
+          <a:bodyPr>
+            <a:normAutofit/>
+          </a:bodyPr>
+          <a:lstStyle/>
+          <a:p>
+            <a:pPr>
+              <a:spcAft>
+                <a:spcPts val="600"/>
+              </a:spcAft>
+            </a:pPr>
+            <a:fld id="{4FAB73BC-B049-4115-A692-8D63A059BFB8}" type="slidenum">
+              <a:rPr lang="en-US" sz="1100">
+                <a:solidFill>
+                  <a:schemeClr val="tx1">
+                    <a:lumMod val="50000"/>
+                    <a:lumOff val="50000"/>
+                  </a:schemeClr>
+                </a:solidFill>
+              </a:rPr>
+              <a:pPr>
+                <a:spcAft>
+                  <a:spcPts val="600"/>
+                </a:spcAft>
+              </a:pPr>
+              <a:t>3</a:t>
+            </a:fld>
+            <a:endParaRPr lang="en-US" sz="1100" dirty="0">
+              <a:solidFill>
+                <a:schemeClr val="tx1">
+                  <a:lumMod val="50000"/>
+                  <a:lumOff val="50000"/>
+                </a:schemeClr>
+              </a:solidFill>
+            </a:endParaRPr>
+          </a:p>
+        </p:txBody>
+      </p:sp>
+    </p:spTree>
+    <p:extLst>
+      <p:ext uri="{BB962C8B-B14F-4D97-AF65-F5344CB8AC3E}">
+        <p14:creationId xmlns:p14="http://schemas.microsoft.com/office/powerpoint/2010/main" val="1794437692"/>
+      </p:ext>
+    </p:extLst>
+  </p:cSld>
+  <p:clrMapOvr>
+    <a:masterClrMapping/>
+  </p:clrMapOvr>
+</p:sld>
+</file>
+
+<file path=ppt/slides/slide4.xml><?xml version="1.0" encoding="utf-8"?>
 <p:sld xmlns:a="http://schemas.openxmlformats.org/drawingml/2006/main" xmlns:r="http://schemas.openxmlformats.org/officeDocument/2006/relationships" xmlns:p="http://schemas.openxmlformats.org/presentationml/2006/main">
   <p:cSld>
     <p:bg>
@@ -6008,7 +6895,7 @@
                   <a:spcPts val="600"/>
                 </a:spcAft>
               </a:pPr>
-              <a:t>6/21/25</a:t>
+              <a:t>6/22/25</a:t>
             </a:fld>
             <a:endParaRPr lang="en-US" sz="1100" dirty="0">
               <a:solidFill>
@@ -6068,7 +6955,7 @@
                   <a:spcPts val="600"/>
                 </a:spcAft>
               </a:pPr>
-              <a:t>3</a:t>
+              <a:t>4</a:t>
             </a:fld>
             <a:endParaRPr lang="en-US" sz="1100">
               <a:solidFill>
@@ -6825,7 +7712,7 @@
 </p:sld>
 </file>
 
-<file path=ppt/slides/slide4.xml><?xml version="1.0" encoding="utf-8"?>
+<file path=ppt/slides/slide5.xml><?xml version="1.0" encoding="utf-8"?>
 <p:sld xmlns:a="http://schemas.openxmlformats.org/drawingml/2006/main" xmlns:r="http://schemas.openxmlformats.org/officeDocument/2006/relationships" xmlns:p="http://schemas.openxmlformats.org/presentationml/2006/main">
   <p:cSld>
     <p:bg>
@@ -7645,7 +8532,7 @@
                   <a:spcPts val="600"/>
                 </a:spcAft>
               </a:pPr>
-              <a:t>6/21/25</a:t>
+              <a:t>6/22/25</a:t>
             </a:fld>
             <a:endParaRPr lang="en-US" sz="1100" dirty="0">
               <a:solidFill>
@@ -7705,7 +8592,7 @@
                   <a:spcPts val="600"/>
                 </a:spcAft>
               </a:pPr>
-              <a:t>4</a:t>
+              <a:t>5</a:t>
             </a:fld>
             <a:endParaRPr lang="en-US" sz="1100">
               <a:solidFill>
@@ -8326,7 +9213,7 @@
 </p:sld>
 </file>
 
-<file path=ppt/slides/slide5.xml><?xml version="1.0" encoding="utf-8"?>
+<file path=ppt/slides/slide6.xml><?xml version="1.0" encoding="utf-8"?>
 <p:sld xmlns:a="http://schemas.openxmlformats.org/drawingml/2006/main" xmlns:r="http://schemas.openxmlformats.org/officeDocument/2006/relationships" xmlns:p="http://schemas.openxmlformats.org/presentationml/2006/main">
   <p:cSld>
     <p:bg>
@@ -8339,7 +9226,13 @@
     </p:bg>
     <p:spTree>
       <p:nvGrpSpPr>
-        <p:cNvPr id="1" name=""/>
+        <p:cNvPr id="1" name="">
+          <a:extLst>
+            <a:ext uri="{FF2B5EF4-FFF2-40B4-BE49-F238E27FC236}">
+              <a16:creationId xmlns:a16="http://schemas.microsoft.com/office/drawing/2014/main" id="{B7A3361C-C506-3CA4-25C0-1F653E5E4F3F}"/>
+            </a:ext>
+          </a:extLst>
+        </p:cNvPr>
         <p:cNvGrpSpPr/>
         <p:nvPr/>
       </p:nvGrpSpPr>
@@ -8353,10 +9246,10 @@
       </p:grpSpPr>
       <p:sp useBgFill="1">
         <p:nvSpPr>
-          <p:cNvPr id="11" name="Rectangle 10">
-            <a:extLst>
-              <a:ext uri="{FF2B5EF4-FFF2-40B4-BE49-F238E27FC236}">
-                <a16:creationId xmlns:a16="http://schemas.microsoft.com/office/drawing/2014/main" id="{DEE2AD96-B495-4E06-9291-B71706F728CB}"/>
+          <p:cNvPr id="8" name="Rectangle 7">
+            <a:extLst>
+              <a:ext uri="{FF2B5EF4-FFF2-40B4-BE49-F238E27FC236}">
+                <a16:creationId xmlns:a16="http://schemas.microsoft.com/office/drawing/2014/main" id="{42869D01-2E79-2D09-FE91-F1B5AEA20BBF}"/>
               </a:ext>
               <a:ext uri="{C183D7F6-B498-43B3-948B-1728B52AA6E4}">
                 <adec:decorative xmlns:adec="http://schemas.microsoft.com/office/drawing/2017/decorative" val="1"/>
@@ -8429,10 +9322,10 @@
       </p:sp>
       <p:sp>
         <p:nvSpPr>
-          <p:cNvPr id="13" name="Rectangle 12">
-            <a:extLst>
-              <a:ext uri="{FF2B5EF4-FFF2-40B4-BE49-F238E27FC236}">
-                <a16:creationId xmlns:a16="http://schemas.microsoft.com/office/drawing/2014/main" id="{53CF6D67-C5A8-4ADD-9E8E-1E38CA1D3166}"/>
+          <p:cNvPr id="10" name="Rectangle 9">
+            <a:extLst>
+              <a:ext uri="{FF2B5EF4-FFF2-40B4-BE49-F238E27FC236}">
+                <a16:creationId xmlns:a16="http://schemas.microsoft.com/office/drawing/2014/main" id="{89095910-4A54-4F0E-F5F4-E0ADC5E80DFE}"/>
               </a:ext>
               <a:ext uri="{C183D7F6-B498-43B3-948B-1728B52AA6E4}">
                 <adec:decorative xmlns:adec="http://schemas.microsoft.com/office/drawing/2017/decorative" val="1"/>
@@ -8451,16 +9344,16 @@
           </p:nvPr>
         </p:nvSpPr>
         <p:spPr>
-          <a:xfrm rot="5400000" flipH="1">
-            <a:off x="-638515" y="639280"/>
-            <a:ext cx="6858000" cy="5579440"/>
+          <a:xfrm flipH="1">
+            <a:off x="-1" y="-1"/>
+            <a:ext cx="12191998" cy="1590742"/>
           </a:xfrm>
           <a:prstGeom prst="rect">
             <a:avLst/>
           </a:prstGeom>
           <a:gradFill>
             <a:gsLst>
-              <a:gs pos="8000">
+              <a:gs pos="0">
                 <a:srgbClr val="000000"/>
               </a:gs>
               <a:gs pos="100000">
@@ -8469,7 +9362,7 @@
                 </a:schemeClr>
               </a:gs>
             </a:gsLst>
-            <a:lin ang="3000000" scaled="0"/>
+            <a:lin ang="8400000" scaled="0"/>
           </a:gradFill>
           <a:ln>
             <a:noFill/>
@@ -8502,10 +9395,10 @@
       </p:sp>
       <p:sp>
         <p:nvSpPr>
-          <p:cNvPr id="15" name="Rectangle 14">
-            <a:extLst>
-              <a:ext uri="{FF2B5EF4-FFF2-40B4-BE49-F238E27FC236}">
-                <a16:creationId xmlns:a16="http://schemas.microsoft.com/office/drawing/2014/main" id="{86909FA0-B515-4681-B7A8-FA281D133B94}"/>
+          <p:cNvPr id="12" name="Rectangle 11">
+            <a:extLst>
+              <a:ext uri="{FF2B5EF4-FFF2-40B4-BE49-F238E27FC236}">
+                <a16:creationId xmlns:a16="http://schemas.microsoft.com/office/drawing/2014/main" id="{145F1EB4-32FC-0AFC-6848-99CD216DD8CC}"/>
               </a:ext>
               <a:ext uri="{C183D7F6-B498-43B3-948B-1728B52AA6E4}">
                 <adec:decorative xmlns:adec="http://schemas.microsoft.com/office/drawing/2017/decorative" val="1"/>
@@ -8524,27 +9417,28 @@
           </p:nvPr>
         </p:nvSpPr>
         <p:spPr>
-          <a:xfrm rot="5400000" flipH="1">
-            <a:off x="-393206" y="395206"/>
-            <a:ext cx="6346209" cy="5576080"/>
+          <a:xfrm rot="10800000" flipH="1">
+            <a:off x="-3" y="0"/>
+            <a:ext cx="8115306" cy="1590742"/>
           </a:xfrm>
           <a:prstGeom prst="rect">
             <a:avLst/>
           </a:prstGeom>
           <a:gradFill>
             <a:gsLst>
-              <a:gs pos="0">
-                <a:srgbClr val="000000">
-                  <a:alpha val="0"/>
-                </a:srgbClr>
-              </a:gs>
-              <a:gs pos="99000">
+              <a:gs pos="20000">
                 <a:schemeClr val="accent1">
                   <a:alpha val="0"/>
                 </a:schemeClr>
               </a:gs>
+              <a:gs pos="100000">
+                <a:schemeClr val="accent1">
+                  <a:lumMod val="50000"/>
+                  <a:alpha val="55000"/>
+                </a:schemeClr>
+              </a:gs>
             </a:gsLst>
-            <a:lin ang="1800000" scaled="0"/>
+            <a:lin ang="13800000" scaled="0"/>
           </a:gradFill>
           <a:ln>
             <a:noFill/>
@@ -8577,10 +9471,10 @@
       </p:sp>
       <p:sp>
         <p:nvSpPr>
-          <p:cNvPr id="17" name="Rectangle 16">
-            <a:extLst>
-              <a:ext uri="{FF2B5EF4-FFF2-40B4-BE49-F238E27FC236}">
-                <a16:creationId xmlns:a16="http://schemas.microsoft.com/office/drawing/2014/main" id="{21C9FE86-FCC3-4A31-AA1C-C882262B7FE7}"/>
+          <p:cNvPr id="14" name="Rectangle 13">
+            <a:extLst>
+              <a:ext uri="{FF2B5EF4-FFF2-40B4-BE49-F238E27FC236}">
+                <a16:creationId xmlns:a16="http://schemas.microsoft.com/office/drawing/2014/main" id="{2B96EC75-9294-2BF0-47FC-702A37D38887}"/>
               </a:ext>
               <a:ext uri="{C183D7F6-B498-43B3-948B-1728B52AA6E4}">
                 <adec:decorative xmlns:adec="http://schemas.microsoft.com/office/drawing/2017/decorative" val="1"/>
@@ -8599,18 +9493,18 @@
           </p:nvPr>
         </p:nvSpPr>
         <p:spPr>
-          <a:xfrm rot="5400000" flipH="1">
-            <a:off x="1528907" y="2818967"/>
-            <a:ext cx="2501979" cy="5576080"/>
+          <a:xfrm flipH="1">
+            <a:off x="8115299" y="-1"/>
+            <a:ext cx="4076698" cy="1590742"/>
           </a:xfrm>
           <a:prstGeom prst="rect">
             <a:avLst/>
           </a:prstGeom>
           <a:gradFill>
             <a:gsLst>
-              <a:gs pos="2000">
+              <a:gs pos="0">
                 <a:schemeClr val="accent1">
-                  <a:alpha val="29000"/>
+                  <a:alpha val="66000"/>
                 </a:schemeClr>
               </a:gs>
               <a:gs pos="100000">
@@ -8619,7 +9513,7 @@
                 </a:srgbClr>
               </a:gs>
             </a:gsLst>
-            <a:lin ang="7800000" scaled="0"/>
+            <a:lin ang="13200000" scaled="0"/>
           </a:gradFill>
           <a:ln>
             <a:noFill/>
@@ -8646,16 +9540,16 @@
           <a:lstStyle/>
           <a:p>
             <a:pPr algn="ctr"/>
-            <a:endParaRPr lang="en-US" dirty="0"/>
-          </a:p>
-        </p:txBody>
-      </p:sp>
-      <p:sp>
-        <p:nvSpPr>
-          <p:cNvPr id="19" name="Rectangle 18">
-            <a:extLst>
-              <a:ext uri="{FF2B5EF4-FFF2-40B4-BE49-F238E27FC236}">
-                <a16:creationId xmlns:a16="http://schemas.microsoft.com/office/drawing/2014/main" id="{7D96243B-ECED-4B71-8E06-AE9A285EAD20}"/>
+            <a:endParaRPr lang="en-US"/>
+          </a:p>
+        </p:txBody>
+      </p:sp>
+      <p:sp>
+        <p:nvSpPr>
+          <p:cNvPr id="16" name="Rectangle 15">
+            <a:extLst>
+              <a:ext uri="{FF2B5EF4-FFF2-40B4-BE49-F238E27FC236}">
+                <a16:creationId xmlns:a16="http://schemas.microsoft.com/office/drawing/2014/main" id="{8972DC84-DE45-91B2-8BFF-F67EE2ACEB47}"/>
               </a:ext>
               <a:ext uri="{C183D7F6-B498-43B3-948B-1728B52AA6E4}">
                 <adec:decorative xmlns:adec="http://schemas.microsoft.com/office/drawing/2017/decorative" val="1"/>
@@ -8674,27 +9568,28 @@
           </p:nvPr>
         </p:nvSpPr>
         <p:spPr>
-          <a:xfrm rot="5400000" flipH="1">
-            <a:off x="-425002" y="852793"/>
-            <a:ext cx="6858001" cy="5152412"/>
+          <a:xfrm>
+            <a:off x="459350" y="-1"/>
+            <a:ext cx="11732646" cy="1597433"/>
           </a:xfrm>
           <a:prstGeom prst="rect">
             <a:avLst/>
           </a:prstGeom>
           <a:gradFill>
             <a:gsLst>
-              <a:gs pos="0">
+              <a:gs pos="50000">
                 <a:srgbClr val="000000">
                   <a:alpha val="0"/>
                 </a:srgbClr>
               </a:gs>
               <a:gs pos="99000">
                 <a:schemeClr val="accent1">
-                  <a:alpha val="11000"/>
+                  <a:lumMod val="50000"/>
+                  <a:alpha val="52000"/>
                 </a:schemeClr>
               </a:gs>
             </a:gsLst>
-            <a:lin ang="7800000" scaled="0"/>
+            <a:lin ang="16800000" scaled="0"/>
           </a:gradFill>
           <a:ln>
             <a:noFill/>
@@ -8727,87 +9622,10 @@
       </p:sp>
       <p:sp>
         <p:nvSpPr>
-          <p:cNvPr id="21" name="Oval 20">
-            <a:extLst>
-              <a:ext uri="{FF2B5EF4-FFF2-40B4-BE49-F238E27FC236}">
-                <a16:creationId xmlns:a16="http://schemas.microsoft.com/office/drawing/2014/main" id="{A09989E4-EFDC-4A90-A633-E0525FB4139E}"/>
-              </a:ext>
-              <a:ext uri="{C183D7F6-B498-43B3-948B-1728B52AA6E4}">
-                <adec:decorative xmlns:adec="http://schemas.microsoft.com/office/drawing/2017/decorative" val="1"/>
-              </a:ext>
-            </a:extLst>
-          </p:cNvPr>
-          <p:cNvSpPr>
-            <a:spLocks noGrp="1" noRot="1" noChangeAspect="1" noMove="1" noResize="1" noEditPoints="1" noAdjustHandles="1" noChangeArrowheads="1" noChangeShapeType="1" noTextEdit="1"/>
-          </p:cNvSpPr>
-          <p:nvPr>
-            <p:extLst>
-              <p:ext uri="{386F3935-93C4-4BCD-93E2-E3B085C9AB24}">
-                <p16:designElem xmlns:p16="http://schemas.microsoft.com/office/powerpoint/2015/main" val="1"/>
-              </p:ext>
-            </p:extLst>
-          </p:nvPr>
-        </p:nvSpPr>
-        <p:spPr>
-          <a:xfrm rot="6097846">
-            <a:off x="818753" y="1128497"/>
-            <a:ext cx="4318303" cy="4318303"/>
-          </a:xfrm>
-          <a:prstGeom prst="ellipse">
-            <a:avLst/>
-          </a:prstGeom>
-          <a:gradFill>
-            <a:gsLst>
-              <a:gs pos="39000">
-                <a:schemeClr val="accent1">
-                  <a:alpha val="0"/>
-                </a:schemeClr>
-              </a:gs>
-              <a:gs pos="100000">
-                <a:schemeClr val="accent1">
-                  <a:lumMod val="60000"/>
-                  <a:lumOff val="40000"/>
-                  <a:alpha val="15000"/>
-                </a:schemeClr>
-              </a:gs>
-            </a:gsLst>
-            <a:lin ang="17400000" scaled="0"/>
-          </a:gradFill>
-          <a:ln>
-            <a:noFill/>
-          </a:ln>
-        </p:spPr>
-        <p:style>
-          <a:lnRef idx="2">
-            <a:schemeClr val="accent1">
-              <a:shade val="50000"/>
-            </a:schemeClr>
-          </a:lnRef>
-          <a:fillRef idx="1">
-            <a:schemeClr val="accent1"/>
-          </a:fillRef>
-          <a:effectRef idx="0">
-            <a:schemeClr val="accent1"/>
-          </a:effectRef>
-          <a:fontRef idx="minor">
-            <a:schemeClr val="lt1"/>
-          </a:fontRef>
-        </p:style>
-        <p:txBody>
-          <a:bodyPr rtlCol="0" anchor="ctr"/>
-          <a:lstStyle/>
-          <a:p>
-            <a:pPr algn="ctr"/>
-            <a:endParaRPr lang="en-US" dirty="0"/>
-          </a:p>
-        </p:txBody>
-      </p:sp>
-      <p:sp>
-        <p:nvSpPr>
           <p:cNvPr id="2" name="Title 1">
             <a:extLst>
               <a:ext uri="{FF2B5EF4-FFF2-40B4-BE49-F238E27FC236}">
-                <a16:creationId xmlns:a16="http://schemas.microsoft.com/office/drawing/2014/main" id="{A89730DD-F570-1F2B-5EE4-5ECB8ED5CE59}"/>
+                <a16:creationId xmlns:a16="http://schemas.microsoft.com/office/drawing/2014/main" id="{5EF20F40-5EAE-5244-0229-9DA0CF233C14}"/>
               </a:ext>
             </a:extLst>
           </p:cNvPr>
@@ -8820,25 +9638,53 @@
         </p:nvSpPr>
         <p:spPr>
           <a:xfrm>
-            <a:off x="826396" y="586855"/>
-            <a:ext cx="4230100" cy="3387497"/>
+            <a:off x="1371599" y="294538"/>
+            <a:ext cx="9895951" cy="1033669"/>
           </a:xfrm>
         </p:spPr>
         <p:txBody>
-          <a:bodyPr anchor="b">
+          <a:bodyPr>
             <a:normAutofit/>
           </a:bodyPr>
           <a:lstStyle/>
           <a:p>
-            <a:pPr algn="r"/>
             <a:r>
               <a:rPr lang="en-US" sz="4000" dirty="0">
                 <a:solidFill>
                   <a:srgbClr val="FFFFFF"/>
                 </a:solidFill>
               </a:rPr>
-              <a:t>Key features</a:t>
-            </a:r>
+              <a:t>Project challenges &amp; successes</a:t>
+            </a:r>
+          </a:p>
+        </p:txBody>
+      </p:sp>
+      <p:sp>
+        <p:nvSpPr>
+          <p:cNvPr id="4" name="Date Placeholder 3">
+            <a:extLst>
+              <a:ext uri="{FF2B5EF4-FFF2-40B4-BE49-F238E27FC236}">
+                <a16:creationId xmlns:a16="http://schemas.microsoft.com/office/drawing/2014/main" id="{C29D55A5-E12E-29EF-AC34-B78FFDCE07B7}"/>
+              </a:ext>
+            </a:extLst>
+          </p:cNvPr>
+          <p:cNvSpPr>
+            <a:spLocks noGrp="1"/>
+          </p:cNvSpPr>
+          <p:nvPr>
+            <p:ph type="dt" sz="half" idx="10"/>
+          </p:nvPr>
+        </p:nvSpPr>
+        <p:spPr/>
+        <p:txBody>
+          <a:bodyPr/>
+          <a:lstStyle/>
+          <a:p>
+            <a:fld id="{E64DCB27-C774-3B49-9C03-A6DFB6FCF569}" type="datetime1">
+              <a:rPr lang="en-US" smtClean="0"/>
+              <a:t>6/22/25</a:t>
+            </a:fld>
+            <a:endParaRPr lang="en-US" dirty="0"/>
           </a:p>
         </p:txBody>
       </p:sp>
@@ -8847,7 +9693,7 @@
           <p:cNvPr id="5" name="Footer Placeholder 4">
             <a:extLst>
               <a:ext uri="{FF2B5EF4-FFF2-40B4-BE49-F238E27FC236}">
-                <a16:creationId xmlns:a16="http://schemas.microsoft.com/office/drawing/2014/main" id="{F60C3EA6-DCFE-B2DE-F988-B414EFD57213}"/>
+                <a16:creationId xmlns:a16="http://schemas.microsoft.com/office/drawing/2014/main" id="{FD24D30A-5A08-7453-C0D8-0DEF9B481B5E}"/>
               </a:ext>
             </a:extLst>
           </p:cNvPr>
@@ -8856,12 +9702,77 @@
           </p:cNvSpPr>
           <p:nvPr>
             <p:ph type="ftr" sz="quarter" idx="11"/>
+          </p:nvPr>
+        </p:nvSpPr>
+        <p:spPr/>
+        <p:txBody>
+          <a:bodyPr/>
+          <a:lstStyle/>
+          <a:p>
+            <a:r>
+              <a:rPr lang="en-US" dirty="0"/>
+              <a:t>San Juan Islands Orca Sighting service: </a:t>
+            </a:r>
+            <a:br>
+              <a:rPr lang="en-US" dirty="0"/>
+            </a:br>
+            <a:r>
+              <a:rPr lang="en-US" dirty="0"/>
+              <a:t>API doc presentation</a:t>
+            </a:r>
+          </a:p>
+        </p:txBody>
+      </p:sp>
+      <p:sp>
+        <p:nvSpPr>
+          <p:cNvPr id="6" name="Slide Number Placeholder 5">
+            <a:extLst>
+              <a:ext uri="{FF2B5EF4-FFF2-40B4-BE49-F238E27FC236}">
+                <a16:creationId xmlns:a16="http://schemas.microsoft.com/office/drawing/2014/main" id="{C889780D-440B-1F0C-D879-6831E818EAF7}"/>
+              </a:ext>
+            </a:extLst>
+          </p:cNvPr>
+          <p:cNvSpPr>
+            <a:spLocks noGrp="1"/>
+          </p:cNvSpPr>
+          <p:nvPr>
+            <p:ph type="sldNum" sz="quarter" idx="12"/>
+          </p:nvPr>
+        </p:nvSpPr>
+        <p:spPr/>
+        <p:txBody>
+          <a:bodyPr/>
+          <a:lstStyle/>
+          <a:p>
+            <a:fld id="{4FAB73BC-B049-4115-A692-8D63A059BFB8}" type="slidenum">
+              <a:rPr lang="en-US" smtClean="0"/>
+              <a:pPr/>
+              <a:t>6</a:t>
+            </a:fld>
+            <a:endParaRPr lang="en-US" dirty="0"/>
+          </a:p>
+        </p:txBody>
+      </p:sp>
+      <p:sp>
+        <p:nvSpPr>
+          <p:cNvPr id="15" name="Content Placeholder 2">
+            <a:extLst>
+              <a:ext uri="{FF2B5EF4-FFF2-40B4-BE49-F238E27FC236}">
+                <a16:creationId xmlns:a16="http://schemas.microsoft.com/office/drawing/2014/main" id="{0AC11956-526A-3E9A-E1B9-DFE50B492BE4}"/>
+              </a:ext>
+            </a:extLst>
+          </p:cNvPr>
+          <p:cNvSpPr>
+            <a:spLocks noGrp="1"/>
+          </p:cNvSpPr>
+          <p:nvPr>
+            <p:ph sz="half" idx="1"/>
           </p:nvPr>
         </p:nvSpPr>
         <p:spPr>
           <a:xfrm>
-            <a:off x="6900596" y="6455664"/>
-            <a:ext cx="4114800" cy="588051"/>
+            <a:off x="838200" y="1825624"/>
+            <a:ext cx="5181600" cy="4463088"/>
           </a:xfrm>
         </p:spPr>
         <p:txBody>
@@ -8870,226 +9781,336 @@
           </a:bodyPr>
           <a:lstStyle/>
           <a:p>
-            <a:pPr>
+            <a:pPr marL="0" indent="0">
+              <a:buNone/>
+            </a:pPr>
+            <a:r>
+              <a:rPr lang="en-US" sz="1400" b="1" dirty="0"/>
+              <a:t>Challenges</a:t>
+            </a:r>
+          </a:p>
+          <a:p>
+            <a:r>
+              <a:rPr lang="en-US" sz="1400" dirty="0"/>
+              <a:t>Git merge issues</a:t>
+            </a:r>
+          </a:p>
+          <a:p>
+            <a:r>
+              <a:rPr lang="en-US" sz="1400" dirty="0"/>
+              <a:t>Setup of Just the Docs theme</a:t>
+            </a:r>
+          </a:p>
+          <a:p>
+            <a:r>
+              <a:rPr lang="en-US" sz="1400" dirty="0"/>
+              <a:t>Terminology ambiguity: parameters vs properties</a:t>
+            </a:r>
+          </a:p>
+          <a:p>
+            <a:r>
+              <a:rPr lang="en-US" sz="1400" dirty="0"/>
+              <a:t>Lots of work required some late nights</a:t>
+            </a:r>
+          </a:p>
+          <a:p>
+            <a:r>
+              <a:rPr lang="en-US" sz="1400" dirty="0"/>
+              <a:t>Needed to edit several files at work directly in GitHub</a:t>
+            </a:r>
+          </a:p>
+          <a:p>
+            <a:r>
+              <a:rPr lang="en-US" sz="1400" dirty="0"/>
+              <a:t>AI responses sometimes sent me down a rabbit hole</a:t>
+            </a:r>
+          </a:p>
+          <a:p>
+            <a:pPr marL="0" indent="0">
+              <a:buNone/>
+            </a:pPr>
+            <a:endParaRPr lang="en-US" sz="2400" dirty="0"/>
+          </a:p>
+        </p:txBody>
+      </p:sp>
+      <p:sp>
+        <p:nvSpPr>
+          <p:cNvPr id="17" name="Content Placeholder 3">
+            <a:extLst>
+              <a:ext uri="{FF2B5EF4-FFF2-40B4-BE49-F238E27FC236}">
+                <a16:creationId xmlns:a16="http://schemas.microsoft.com/office/drawing/2014/main" id="{DDDA5ABE-9223-6DFC-BA2B-3131A8AFB650}"/>
+              </a:ext>
+            </a:extLst>
+          </p:cNvPr>
+          <p:cNvSpPr txBox="1">
+            <a:spLocks/>
+          </p:cNvSpPr>
+          <p:nvPr/>
+        </p:nvSpPr>
+        <p:spPr>
+          <a:xfrm>
+            <a:off x="6172200" y="1825625"/>
+            <a:ext cx="5181600" cy="4145517"/>
+          </a:xfrm>
+          <a:prstGeom prst="rect">
+            <a:avLst/>
+          </a:prstGeom>
+        </p:spPr>
+        <p:txBody>
+          <a:bodyPr>
+            <a:noAutofit/>
+          </a:bodyPr>
+          <a:lstStyle>
+            <a:lvl1pPr marL="228600" indent="-228600" algn="l" defTabSz="914400" rtl="0" eaLnBrk="1" latinLnBrk="0" hangingPunct="1">
               <a:lnSpc>
                 <a:spcPct val="90000"/>
               </a:lnSpc>
-              <a:spcAft>
-                <a:spcPts val="600"/>
-              </a:spcAft>
-            </a:pPr>
-            <a:r>
-              <a:rPr lang="en-US" sz="1100" dirty="0">
+              <a:spcBef>
+                <a:spcPts val="1000"/>
+              </a:spcBef>
+              <a:buFont typeface="Arial" panose="020B0604020202020204" pitchFamily="34" charset="0"/>
+              <a:buChar char="•"/>
+              <a:defRPr sz="2800" kern="1200">
                 <a:solidFill>
-                  <a:schemeClr val="tx1">
-                    <a:lumMod val="50000"/>
-                    <a:lumOff val="50000"/>
-                  </a:schemeClr>
+                  <a:schemeClr val="tx1"/>
                 </a:solidFill>
-              </a:rPr>
-              <a:t>San Juan Islands Orca Sighting Service:  API doc presentation</a:t>
-            </a:r>
-          </a:p>
-          <a:p>
-            <a:pPr algn="l">
+                <a:latin typeface="+mn-lt"/>
+                <a:ea typeface="+mn-ea"/>
+                <a:cs typeface="+mn-cs"/>
+              </a:defRPr>
+            </a:lvl1pPr>
+            <a:lvl2pPr marL="685800" indent="-228600" algn="l" defTabSz="914400" rtl="0" eaLnBrk="1" latinLnBrk="0" hangingPunct="1">
               <a:lnSpc>
                 <a:spcPct val="90000"/>
               </a:lnSpc>
-              <a:spcAft>
-                <a:spcPts val="600"/>
-              </a:spcAft>
+              <a:spcBef>
+                <a:spcPts val="500"/>
+              </a:spcBef>
+              <a:buFont typeface="Arial" panose="020B0604020202020204" pitchFamily="34" charset="0"/>
+              <a:buChar char="•"/>
+              <a:defRPr sz="2400" kern="1200">
+                <a:solidFill>
+                  <a:schemeClr val="tx1"/>
+                </a:solidFill>
+                <a:latin typeface="+mn-lt"/>
+                <a:ea typeface="+mn-ea"/>
+                <a:cs typeface="+mn-cs"/>
+              </a:defRPr>
+            </a:lvl2pPr>
+            <a:lvl3pPr marL="1143000" indent="-228600" algn="l" defTabSz="914400" rtl="0" eaLnBrk="1" latinLnBrk="0" hangingPunct="1">
+              <a:lnSpc>
+                <a:spcPct val="90000"/>
+              </a:lnSpc>
+              <a:spcBef>
+                <a:spcPts val="500"/>
+              </a:spcBef>
+              <a:buFont typeface="Arial" panose="020B0604020202020204" pitchFamily="34" charset="0"/>
+              <a:buChar char="•"/>
+              <a:defRPr sz="2000" kern="1200">
+                <a:solidFill>
+                  <a:schemeClr val="tx1"/>
+                </a:solidFill>
+                <a:latin typeface="+mn-lt"/>
+                <a:ea typeface="+mn-ea"/>
+                <a:cs typeface="+mn-cs"/>
+              </a:defRPr>
+            </a:lvl3pPr>
+            <a:lvl4pPr marL="1600200" indent="-228600" algn="l" defTabSz="914400" rtl="0" eaLnBrk="1" latinLnBrk="0" hangingPunct="1">
+              <a:lnSpc>
+                <a:spcPct val="90000"/>
+              </a:lnSpc>
+              <a:spcBef>
+                <a:spcPts val="500"/>
+              </a:spcBef>
+              <a:buFont typeface="Arial" panose="020B0604020202020204" pitchFamily="34" charset="0"/>
+              <a:buChar char="•"/>
+              <a:defRPr sz="1800" kern="1200">
+                <a:solidFill>
+                  <a:schemeClr val="tx1"/>
+                </a:solidFill>
+                <a:latin typeface="+mn-lt"/>
+                <a:ea typeface="+mn-ea"/>
+                <a:cs typeface="+mn-cs"/>
+              </a:defRPr>
+            </a:lvl4pPr>
+            <a:lvl5pPr marL="2057400" indent="-228600" algn="l" defTabSz="914400" rtl="0" eaLnBrk="1" latinLnBrk="0" hangingPunct="1">
+              <a:lnSpc>
+                <a:spcPct val="90000"/>
+              </a:lnSpc>
+              <a:spcBef>
+                <a:spcPts val="500"/>
+              </a:spcBef>
+              <a:buFont typeface="Arial" panose="020B0604020202020204" pitchFamily="34" charset="0"/>
+              <a:buChar char="•"/>
+              <a:defRPr sz="1800" kern="1200">
+                <a:solidFill>
+                  <a:schemeClr val="tx1"/>
+                </a:solidFill>
+                <a:latin typeface="+mn-lt"/>
+                <a:ea typeface="+mn-ea"/>
+                <a:cs typeface="+mn-cs"/>
+              </a:defRPr>
+            </a:lvl5pPr>
+            <a:lvl6pPr marL="2514600" indent="-228600" algn="l" defTabSz="914400" rtl="0" eaLnBrk="1" latinLnBrk="0" hangingPunct="1">
+              <a:lnSpc>
+                <a:spcPct val="90000"/>
+              </a:lnSpc>
+              <a:spcBef>
+                <a:spcPts val="500"/>
+              </a:spcBef>
+              <a:buFont typeface="Arial" panose="020B0604020202020204" pitchFamily="34" charset="0"/>
+              <a:buChar char="•"/>
+              <a:defRPr sz="1800" kern="1200">
+                <a:solidFill>
+                  <a:schemeClr val="tx1"/>
+                </a:solidFill>
+                <a:latin typeface="+mn-lt"/>
+                <a:ea typeface="+mn-ea"/>
+                <a:cs typeface="+mn-cs"/>
+              </a:defRPr>
+            </a:lvl6pPr>
+            <a:lvl7pPr marL="2971800" indent="-228600" algn="l" defTabSz="914400" rtl="0" eaLnBrk="1" latinLnBrk="0" hangingPunct="1">
+              <a:lnSpc>
+                <a:spcPct val="90000"/>
+              </a:lnSpc>
+              <a:spcBef>
+                <a:spcPts val="500"/>
+              </a:spcBef>
+              <a:buFont typeface="Arial" panose="020B0604020202020204" pitchFamily="34" charset="0"/>
+              <a:buChar char="•"/>
+              <a:defRPr sz="1800" kern="1200">
+                <a:solidFill>
+                  <a:schemeClr val="tx1"/>
+                </a:solidFill>
+                <a:latin typeface="+mn-lt"/>
+                <a:ea typeface="+mn-ea"/>
+                <a:cs typeface="+mn-cs"/>
+              </a:defRPr>
+            </a:lvl7pPr>
+            <a:lvl8pPr marL="3429000" indent="-228600" algn="l" defTabSz="914400" rtl="0" eaLnBrk="1" latinLnBrk="0" hangingPunct="1">
+              <a:lnSpc>
+                <a:spcPct val="90000"/>
+              </a:lnSpc>
+              <a:spcBef>
+                <a:spcPts val="500"/>
+              </a:spcBef>
+              <a:buFont typeface="Arial" panose="020B0604020202020204" pitchFamily="34" charset="0"/>
+              <a:buChar char="•"/>
+              <a:defRPr sz="1800" kern="1200">
+                <a:solidFill>
+                  <a:schemeClr val="tx1"/>
+                </a:solidFill>
+                <a:latin typeface="+mn-lt"/>
+                <a:ea typeface="+mn-ea"/>
+                <a:cs typeface="+mn-cs"/>
+              </a:defRPr>
+            </a:lvl8pPr>
+            <a:lvl9pPr marL="3886200" indent="-228600" algn="l" defTabSz="914400" rtl="0" eaLnBrk="1" latinLnBrk="0" hangingPunct="1">
+              <a:lnSpc>
+                <a:spcPct val="90000"/>
+              </a:lnSpc>
+              <a:spcBef>
+                <a:spcPts val="500"/>
+              </a:spcBef>
+              <a:buFont typeface="Arial" panose="020B0604020202020204" pitchFamily="34" charset="0"/>
+              <a:buChar char="•"/>
+              <a:defRPr sz="1800" kern="1200">
+                <a:solidFill>
+                  <a:schemeClr val="tx1"/>
+                </a:solidFill>
+                <a:latin typeface="+mn-lt"/>
+                <a:ea typeface="+mn-ea"/>
+                <a:cs typeface="+mn-cs"/>
+              </a:defRPr>
+            </a:lvl9pPr>
+          </a:lstStyle>
+          <a:p>
+            <a:pPr marL="0" indent="0">
+              <a:buNone/>
             </a:pPr>
-            <a:endParaRPr lang="en-US" sz="700" dirty="0">
-              <a:solidFill>
-                <a:schemeClr val="tx1">
-                  <a:lumMod val="50000"/>
-                  <a:lumOff val="50000"/>
-                </a:schemeClr>
-              </a:solidFill>
-            </a:endParaRPr>
-          </a:p>
-        </p:txBody>
-      </p:sp>
-      <p:sp>
-        <p:nvSpPr>
-          <p:cNvPr id="3" name="Content Placeholder 2">
-            <a:extLst>
-              <a:ext uri="{FF2B5EF4-FFF2-40B4-BE49-F238E27FC236}">
-                <a16:creationId xmlns:a16="http://schemas.microsoft.com/office/drawing/2014/main" id="{93B15F46-599B-7F27-B4A8-9FF6EDD3EB2C}"/>
-              </a:ext>
-            </a:extLst>
-          </p:cNvPr>
-          <p:cNvSpPr>
-            <a:spLocks noGrp="1"/>
-          </p:cNvSpPr>
-          <p:nvPr>
-            <p:ph idx="1"/>
-          </p:nvPr>
-        </p:nvSpPr>
-        <p:spPr>
-          <a:xfrm>
-            <a:off x="6503158" y="649480"/>
-            <a:ext cx="4862447" cy="5546047"/>
-          </a:xfrm>
-        </p:spPr>
-        <p:txBody>
-          <a:bodyPr anchor="ctr">
-            <a:normAutofit/>
-          </a:bodyPr>
-          <a:lstStyle/>
-          <a:p>
-            <a:r>
-              <a:rPr lang="en-US" sz="2400" dirty="0"/>
-              <a:t>Well-structured, searchable, and navigable documentation.</a:t>
-            </a:r>
-          </a:p>
-          <a:p>
-            <a:r>
-              <a:rPr lang="en-US" sz="2400" dirty="0"/>
-              <a:t>Clear and concise explanations.</a:t>
-            </a:r>
-          </a:p>
-          <a:p>
-            <a:r>
-              <a:rPr lang="en-US" sz="2400" dirty="0"/>
-              <a:t>Comprehensive API reference and helpful tutorials.</a:t>
-            </a:r>
-          </a:p>
-          <a:p>
-            <a:r>
-              <a:rPr lang="en-US" sz="2400" dirty="0"/>
-              <a:t>Focus on user experience and ease of adoption.</a:t>
-            </a:r>
-          </a:p>
-          <a:p>
-            <a:endParaRPr lang="en-US" sz="1700" dirty="0"/>
-          </a:p>
-        </p:txBody>
-      </p:sp>
-      <p:sp>
-        <p:nvSpPr>
-          <p:cNvPr id="4" name="Date Placeholder 3">
-            <a:extLst>
-              <a:ext uri="{FF2B5EF4-FFF2-40B4-BE49-F238E27FC236}">
-                <a16:creationId xmlns:a16="http://schemas.microsoft.com/office/drawing/2014/main" id="{617A8013-C101-BCE8-72C3-FD54061258D2}"/>
-              </a:ext>
-            </a:extLst>
-          </p:cNvPr>
-          <p:cNvSpPr>
-            <a:spLocks noGrp="1"/>
-          </p:cNvSpPr>
-          <p:nvPr>
-            <p:ph type="dt" sz="half" idx="10"/>
-          </p:nvPr>
-        </p:nvSpPr>
-        <p:spPr>
-          <a:xfrm>
-            <a:off x="8970264" y="6455664"/>
-            <a:ext cx="2743200" cy="365125"/>
-          </a:xfrm>
-        </p:spPr>
-        <p:txBody>
-          <a:bodyPr>
-            <a:normAutofit/>
-          </a:bodyPr>
-          <a:lstStyle/>
-          <a:p>
-            <a:pPr algn="r">
-              <a:spcAft>
-                <a:spcPts val="600"/>
-              </a:spcAft>
-            </a:pPr>
-            <a:fld id="{9308F748-AE99-6440-BF2C-6243626888D3}" type="datetime1">
-              <a:rPr lang="en-US" sz="1100">
-                <a:solidFill>
-                  <a:schemeClr val="tx1">
-                    <a:lumMod val="50000"/>
-                    <a:lumOff val="50000"/>
-                  </a:schemeClr>
-                </a:solidFill>
-              </a:rPr>
-              <a:pPr algn="r">
-                <a:spcAft>
-                  <a:spcPts val="600"/>
-                </a:spcAft>
-              </a:pPr>
-              <a:t>6/21/25</a:t>
-            </a:fld>
-            <a:endParaRPr lang="en-US" sz="1100" dirty="0">
-              <a:solidFill>
-                <a:schemeClr val="tx1">
-                  <a:lumMod val="50000"/>
-                  <a:lumOff val="50000"/>
-                </a:schemeClr>
-              </a:solidFill>
-            </a:endParaRPr>
-          </a:p>
-        </p:txBody>
-      </p:sp>
-      <p:sp>
-        <p:nvSpPr>
-          <p:cNvPr id="6" name="Slide Number Placeholder 5">
-            <a:extLst>
-              <a:ext uri="{FF2B5EF4-FFF2-40B4-BE49-F238E27FC236}">
-                <a16:creationId xmlns:a16="http://schemas.microsoft.com/office/drawing/2014/main" id="{595666C1-B530-DCB6-1CE9-A7BD001D66BF}"/>
-              </a:ext>
-            </a:extLst>
-          </p:cNvPr>
-          <p:cNvSpPr>
-            <a:spLocks noGrp="1"/>
-          </p:cNvSpPr>
-          <p:nvPr>
-            <p:ph type="sldNum" sz="quarter" idx="12"/>
-          </p:nvPr>
-        </p:nvSpPr>
-        <p:spPr>
-          <a:xfrm>
-            <a:off x="11704320" y="6455664"/>
-            <a:ext cx="448056" cy="365125"/>
-          </a:xfrm>
-        </p:spPr>
-        <p:txBody>
-          <a:bodyPr>
-            <a:normAutofit/>
-          </a:bodyPr>
-          <a:lstStyle/>
-          <a:p>
-            <a:pPr>
-              <a:spcAft>
-                <a:spcPts val="600"/>
-              </a:spcAft>
-            </a:pPr>
-            <a:fld id="{4FAB73BC-B049-4115-A692-8D63A059BFB8}" type="slidenum">
-              <a:rPr lang="en-US" sz="1100">
-                <a:solidFill>
-                  <a:schemeClr val="tx1">
-                    <a:lumMod val="50000"/>
-                    <a:lumOff val="50000"/>
-                  </a:schemeClr>
-                </a:solidFill>
-              </a:rPr>
-              <a:pPr>
-                <a:spcAft>
-                  <a:spcPts val="600"/>
-                </a:spcAft>
-              </a:pPr>
-              <a:t>5</a:t>
-            </a:fld>
-            <a:endParaRPr lang="en-US" sz="1100" dirty="0">
-              <a:solidFill>
-                <a:schemeClr val="tx1">
-                  <a:lumMod val="50000"/>
-                  <a:lumOff val="50000"/>
-                </a:schemeClr>
-              </a:solidFill>
-            </a:endParaRPr>
+            <a:r>
+              <a:rPr lang="en-US" sz="1400" b="1" dirty="0"/>
+              <a:t>Successes</a:t>
+            </a:r>
+          </a:p>
+          <a:p>
+            <a:r>
+              <a:rPr lang="en-US" sz="1400" dirty="0"/>
+              <a:t>Effective SME support</a:t>
+            </a:r>
+          </a:p>
+          <a:p>
+            <a:r>
+              <a:rPr lang="en-US" sz="1400" dirty="0"/>
+              <a:t>Content visualization &amp; planning: Used Notion to help me visualize structure of docs and improve content navigation</a:t>
+            </a:r>
+          </a:p>
+          <a:p>
+            <a:r>
+              <a:rPr lang="en-US" sz="1400" dirty="0"/>
+              <a:t>Consistent additions to repository</a:t>
+            </a:r>
+          </a:p>
+          <a:p>
+            <a:r>
+              <a:rPr lang="en-US" sz="1400" dirty="0"/>
+              <a:t>AI-assisted content generation: Used Gemini 2.5 Flash for help in writing ISO 8601 format topic, generating data tables, </a:t>
+            </a:r>
+            <a:r>
+              <a:rPr lang="en-US" sz="1400" dirty="0" err="1"/>
+              <a:t>cURL</a:t>
+            </a:r>
+            <a:r>
+              <a:rPr lang="en-US" sz="1400" dirty="0"/>
+              <a:t> examples, and creating outlines for tutorials, significantly speeding up repetitive work</a:t>
+            </a:r>
+          </a:p>
+          <a:p>
+            <a:r>
+              <a:rPr lang="en-US" sz="1400" dirty="0"/>
+              <a:t>Successfully figured out how to edit the _</a:t>
+            </a:r>
+            <a:r>
+              <a:rPr lang="en-US" sz="1400" dirty="0" err="1"/>
+              <a:t>config.yml</a:t>
+            </a:r>
+            <a:r>
+              <a:rPr lang="en-US" sz="1400" dirty="0"/>
+              <a:t> file to add the Just the Docs theme</a:t>
+            </a:r>
+          </a:p>
+          <a:p>
+            <a:r>
+              <a:rPr lang="en-US" sz="1400" dirty="0"/>
+              <a:t>Learned</a:t>
+            </a:r>
+            <a:r>
+              <a:rPr lang="en-US" sz="1400" b="1" dirty="0"/>
+              <a:t> </a:t>
+            </a:r>
+            <a:r>
+              <a:rPr lang="en-US" sz="1400" dirty="0"/>
+              <a:t>new Markdown tricks, such as linking to headings, adding images, and emojis.</a:t>
+            </a:r>
+          </a:p>
+          <a:p>
+            <a:r>
+              <a:rPr lang="en-US" sz="1400" dirty="0"/>
+              <a:t>Usability testing went smoothly and suggestions improved the docs</a:t>
+            </a:r>
+          </a:p>
+          <a:p>
+            <a:r>
+              <a:rPr lang="en-US" sz="1400" dirty="0"/>
+              <a:t>Improved Git workflow</a:t>
+            </a:r>
           </a:p>
         </p:txBody>
       </p:sp>
     </p:spTree>
     <p:extLst>
       <p:ext uri="{BB962C8B-B14F-4D97-AF65-F5344CB8AC3E}">
-        <p14:creationId xmlns:p14="http://schemas.microsoft.com/office/powerpoint/2010/main" val="1794437692"/>
+        <p14:creationId xmlns:p14="http://schemas.microsoft.com/office/powerpoint/2010/main" val="1246446835"/>
       </p:ext>
     </p:extLst>
   </p:cSld>
@@ -9099,7 +10120,7 @@
 </p:sld>
 </file>
 
-<file path=ppt/slides/slide6.xml><?xml version="1.0" encoding="utf-8"?>
+<file path=ppt/slides/slide7.xml><?xml version="1.0" encoding="utf-8"?>
 <p:sld xmlns:a="http://schemas.openxmlformats.org/drawingml/2006/main" xmlns:r="http://schemas.openxmlformats.org/officeDocument/2006/relationships" xmlns:p="http://schemas.openxmlformats.org/presentationml/2006/main">
   <p:cSld>
     <p:bg>
@@ -9568,7 +10589,7 @@
           <a:p>
             <a:fld id="{E64DCB27-C774-3B49-9C03-A6DFB6FCF569}" type="datetime1">
               <a:rPr lang="en-US" smtClean="0"/>
-              <a:t>6/21/25</a:t>
+              <a:t>6/22/25</a:t>
             </a:fld>
             <a:endParaRPr lang="en-US" dirty="0"/>
           </a:p>
@@ -9633,7 +10654,7 @@
             <a:fld id="{4FAB73BC-B049-4115-A692-8D63A059BFB8}" type="slidenum">
               <a:rPr lang="en-US" smtClean="0"/>
               <a:pPr/>
-              <a:t>6</a:t>
+              <a:t>7</a:t>
             </a:fld>
             <a:endParaRPr lang="en-US" dirty="0"/>
           </a:p>
@@ -9996,7 +11017,7 @@
 </p:sld>
 </file>
 
-<file path=ppt/slides/slide7.xml><?xml version="1.0" encoding="utf-8"?>
+<file path=ppt/slides/slide8.xml><?xml version="1.0" encoding="utf-8"?>
 <p:sld xmlns:a="http://schemas.openxmlformats.org/drawingml/2006/main" xmlns:r="http://schemas.openxmlformats.org/officeDocument/2006/relationships" xmlns:p="http://schemas.openxmlformats.org/presentationml/2006/main">
   <p:cSld>
     <p:bg>
@@ -10677,7 +11698,7 @@
                   <a:spcPts val="600"/>
                 </a:spcAft>
               </a:pPr>
-              <a:t>6/21/25</a:t>
+              <a:t>6/22/25</a:t>
             </a:fld>
             <a:endParaRPr lang="en-US" sz="1100" dirty="0">
               <a:solidFill>
@@ -10737,7 +11758,7 @@
                   <a:spcPts val="600"/>
                 </a:spcAft>
               </a:pPr>
-              <a:t>7</a:t>
+              <a:t>8</a:t>
             </a:fld>
             <a:endParaRPr lang="en-US" sz="1100" dirty="0">
               <a:solidFill>

</xml_diff>